<commit_message>
Preserved all the formatting for all the textboxes. Original text fitting still needs to be fixed
</commit_message>
<xml_diff>
--- a/buchtemplate_single.pptx
+++ b/buchtemplate_single.pptx
@@ -113,6 +113,271 @@
     </p:ext>
   </p:extLst>
 </p:presentation>
+</file>
+
+<file path=ppt/revisionInfo.xml><?xml version="1.0" encoding="utf-8"?>
+<p1510:revInfo xmlns:a="http://schemas.openxmlformats.org/drawingml/2006/main" xmlns:r="http://schemas.openxmlformats.org/officeDocument/2006/relationships" xmlns:p1510="http://schemas.microsoft.com/office/powerpoint/2015/10/main">
+  <p1510:revLst>
+    <p1510:client id="{BD228509-EBEE-4041-AD03-C83B752495C1}" v="69" dt="2025-04-15T21:37:30.875"/>
+  </p1510:revLst>
+</p1510:revInfo>
+</file>
+
+<file path=ppt/changesInfos/changesInfo1.xml><?xml version="1.0" encoding="utf-8"?>
+<pc:chgInfo xmlns:a="http://schemas.openxmlformats.org/drawingml/2006/main" xmlns:r="http://schemas.openxmlformats.org/officeDocument/2006/relationships" xmlns:ac="http://schemas.microsoft.com/office/drawing/2013/main/command" xmlns:pc="http://schemas.microsoft.com/office/powerpoint/2013/main/command">
+  <pc:docChgLst>
+    <pc:chgData name="Patrick Struzyna" userId="b998d42b-3731-425d-8f35-817176e8a205" providerId="ADAL" clId="{BD228509-EBEE-4041-AD03-C83B752495C1}"/>
+    <pc:docChg chg="custSel modSld modMainMaster">
+      <pc:chgData name="Patrick Struzyna" userId="b998d42b-3731-425d-8f35-817176e8a205" providerId="ADAL" clId="{BD228509-EBEE-4041-AD03-C83B752495C1}" dt="2025-04-15T21:37:30.875" v="278" actId="962"/>
+      <pc:docMkLst>
+        <pc:docMk/>
+      </pc:docMkLst>
+      <pc:sldChg chg="modSp mod">
+        <pc:chgData name="Patrick Struzyna" userId="b998d42b-3731-425d-8f35-817176e8a205" providerId="ADAL" clId="{BD228509-EBEE-4041-AD03-C83B752495C1}" dt="2025-04-15T21:37:30.875" v="278" actId="962"/>
+        <pc:sldMkLst>
+          <pc:docMk/>
+          <pc:sldMk cId="2671961889" sldId="297"/>
+        </pc:sldMkLst>
+        <pc:spChg chg="mod">
+          <ac:chgData name="Patrick Struzyna" userId="b998d42b-3731-425d-8f35-817176e8a205" providerId="ADAL" clId="{BD228509-EBEE-4041-AD03-C83B752495C1}" dt="2025-04-15T21:35:20.908" v="263" actId="962"/>
+          <ac:spMkLst>
+            <pc:docMk/>
+            <pc:sldMk cId="2671961889" sldId="297"/>
+            <ac:spMk id="2" creationId="{7F8ACC8F-BA12-AE8E-CB96-5D1E357EC026}"/>
+          </ac:spMkLst>
+        </pc:spChg>
+        <pc:spChg chg="mod">
+          <ac:chgData name="Patrick Struzyna" userId="b998d42b-3731-425d-8f35-817176e8a205" providerId="ADAL" clId="{BD228509-EBEE-4041-AD03-C83B752495C1}" dt="2025-04-15T21:35:33.001" v="264" actId="962"/>
+          <ac:spMkLst>
+            <pc:docMk/>
+            <pc:sldMk cId="2671961889" sldId="297"/>
+            <ac:spMk id="5" creationId="{E7B291FF-AB97-1450-BAB2-CF09F093B70F}"/>
+          </ac:spMkLst>
+        </pc:spChg>
+        <pc:spChg chg="mod">
+          <ac:chgData name="Patrick Struzyna" userId="b998d42b-3731-425d-8f35-817176e8a205" providerId="ADAL" clId="{BD228509-EBEE-4041-AD03-C83B752495C1}" dt="2025-04-15T21:35:38.690" v="265" actId="962"/>
+          <ac:spMkLst>
+            <pc:docMk/>
+            <pc:sldMk cId="2671961889" sldId="297"/>
+            <ac:spMk id="6" creationId="{33A922BC-A1AA-AE93-E84D-BCB9061E82D9}"/>
+          </ac:spMkLst>
+        </pc:spChg>
+        <pc:spChg chg="mod">
+          <ac:chgData name="Patrick Struzyna" userId="b998d42b-3731-425d-8f35-817176e8a205" providerId="ADAL" clId="{BD228509-EBEE-4041-AD03-C83B752495C1}" dt="2025-04-15T21:35:49.715" v="268" actId="962"/>
+          <ac:spMkLst>
+            <pc:docMk/>
+            <pc:sldMk cId="2671961889" sldId="297"/>
+            <ac:spMk id="7" creationId="{126C4CFE-D9B1-18BB-823F-28F648068F7C}"/>
+          </ac:spMkLst>
+        </pc:spChg>
+        <pc:spChg chg="mod">
+          <ac:chgData name="Patrick Struzyna" userId="b998d42b-3731-425d-8f35-817176e8a205" providerId="ADAL" clId="{BD228509-EBEE-4041-AD03-C83B752495C1}" dt="2025-04-15T21:35:58.287" v="269" actId="962"/>
+          <ac:spMkLst>
+            <pc:docMk/>
+            <pc:sldMk cId="2671961889" sldId="297"/>
+            <ac:spMk id="8" creationId="{20F84033-1852-7433-DAB3-7154C16F0363}"/>
+          </ac:spMkLst>
+        </pc:spChg>
+        <pc:spChg chg="mod">
+          <ac:chgData name="Patrick Struzyna" userId="b998d42b-3731-425d-8f35-817176e8a205" providerId="ADAL" clId="{BD228509-EBEE-4041-AD03-C83B752495C1}" dt="2025-04-15T21:36:29.782" v="270" actId="962"/>
+          <ac:spMkLst>
+            <pc:docMk/>
+            <pc:sldMk cId="2671961889" sldId="297"/>
+            <ac:spMk id="9" creationId="{64905E3B-83EA-D084-EB24-689F8329F107}"/>
+          </ac:spMkLst>
+        </pc:spChg>
+        <pc:spChg chg="mod">
+          <ac:chgData name="Patrick Struzyna" userId="b998d42b-3731-425d-8f35-817176e8a205" providerId="ADAL" clId="{BD228509-EBEE-4041-AD03-C83B752495C1}" dt="2025-04-15T21:36:36.372" v="271" actId="962"/>
+          <ac:spMkLst>
+            <pc:docMk/>
+            <pc:sldMk cId="2671961889" sldId="297"/>
+            <ac:spMk id="10" creationId="{A0916798-0E44-EFFF-B2E3-D4FD36C0582B}"/>
+          </ac:spMkLst>
+        </pc:spChg>
+        <pc:spChg chg="mod">
+          <ac:chgData name="Patrick Struzyna" userId="b998d42b-3731-425d-8f35-817176e8a205" providerId="ADAL" clId="{BD228509-EBEE-4041-AD03-C83B752495C1}" dt="2025-04-15T21:37:07.592" v="276" actId="962"/>
+          <ac:spMkLst>
+            <pc:docMk/>
+            <pc:sldMk cId="2671961889" sldId="297"/>
+            <ac:spMk id="11" creationId="{BC82B7C4-9603-5AD4-4EF1-D6F34B9E1E58}"/>
+          </ac:spMkLst>
+        </pc:spChg>
+        <pc:spChg chg="mod">
+          <ac:chgData name="Patrick Struzyna" userId="b998d42b-3731-425d-8f35-817176e8a205" providerId="ADAL" clId="{BD228509-EBEE-4041-AD03-C83B752495C1}" dt="2025-04-15T21:36:53.934" v="274" actId="962"/>
+          <ac:spMkLst>
+            <pc:docMk/>
+            <pc:sldMk cId="2671961889" sldId="297"/>
+            <ac:spMk id="12" creationId="{0710BEB7-7565-B883-6E4D-B8E53AB7D6CF}"/>
+          </ac:spMkLst>
+        </pc:spChg>
+        <pc:spChg chg="mod">
+          <ac:chgData name="Patrick Struzyna" userId="b998d42b-3731-425d-8f35-817176e8a205" providerId="ADAL" clId="{BD228509-EBEE-4041-AD03-C83B752495C1}" dt="2025-04-15T21:37:01.356" v="275" actId="962"/>
+          <ac:spMkLst>
+            <pc:docMk/>
+            <pc:sldMk cId="2671961889" sldId="297"/>
+            <ac:spMk id="13" creationId="{46573461-561F-1C1C-3C4C-A0786DE7CA0E}"/>
+          </ac:spMkLst>
+        </pc:spChg>
+        <pc:spChg chg="mod">
+          <ac:chgData name="Patrick Struzyna" userId="b998d42b-3731-425d-8f35-817176e8a205" providerId="ADAL" clId="{BD228509-EBEE-4041-AD03-C83B752495C1}" dt="2025-04-15T21:36:44.099" v="272" actId="962"/>
+          <ac:spMkLst>
+            <pc:docMk/>
+            <pc:sldMk cId="2671961889" sldId="297"/>
+            <ac:spMk id="14" creationId="{38F65BA3-D994-504F-793B-AC889BE4FF88}"/>
+          </ac:spMkLst>
+        </pc:spChg>
+        <pc:spChg chg="mod">
+          <ac:chgData name="Patrick Struzyna" userId="b998d42b-3731-425d-8f35-817176e8a205" providerId="ADAL" clId="{BD228509-EBEE-4041-AD03-C83B752495C1}" dt="2025-04-15T21:37:17.881" v="277" actId="962"/>
+          <ac:spMkLst>
+            <pc:docMk/>
+            <pc:sldMk cId="2671961889" sldId="297"/>
+            <ac:spMk id="15" creationId="{974D2E7E-FDC4-B68D-8D9F-62019DB3CF4C}"/>
+          </ac:spMkLst>
+        </pc:spChg>
+        <pc:spChg chg="mod">
+          <ac:chgData name="Patrick Struzyna" userId="b998d42b-3731-425d-8f35-817176e8a205" providerId="ADAL" clId="{BD228509-EBEE-4041-AD03-C83B752495C1}" dt="2025-04-15T21:37:30.875" v="278" actId="962"/>
+          <ac:spMkLst>
+            <pc:docMk/>
+            <pc:sldMk cId="2671961889" sldId="297"/>
+            <ac:spMk id="16" creationId="{7E482C1A-9262-189E-D70B-555649E239B9}"/>
+          </ac:spMkLst>
+        </pc:spChg>
+      </pc:sldChg>
+      <pc:sldMasterChg chg="modSldLayout">
+        <pc:chgData name="Patrick Struzyna" userId="b998d42b-3731-425d-8f35-817176e8a205" providerId="ADAL" clId="{BD228509-EBEE-4041-AD03-C83B752495C1}" dt="2025-04-15T20:58:48.697" v="120" actId="20577"/>
+        <pc:sldMasterMkLst>
+          <pc:docMk/>
+          <pc:sldMasterMk cId="773808826" sldId="2147483684"/>
+        </pc:sldMasterMkLst>
+        <pc:sldLayoutChg chg="modSp mod">
+          <pc:chgData name="Patrick Struzyna" userId="b998d42b-3731-425d-8f35-817176e8a205" providerId="ADAL" clId="{BD228509-EBEE-4041-AD03-C83B752495C1}" dt="2025-04-15T20:58:48.697" v="120" actId="20577"/>
+          <pc:sldLayoutMkLst>
+            <pc:docMk/>
+            <pc:sldMasterMk cId="773808826" sldId="2147483684"/>
+            <pc:sldLayoutMk cId="4277260665" sldId="2147483708"/>
+          </pc:sldLayoutMkLst>
+          <pc:spChg chg="mod">
+            <ac:chgData name="Patrick Struzyna" userId="b998d42b-3731-425d-8f35-817176e8a205" providerId="ADAL" clId="{BD228509-EBEE-4041-AD03-C83B752495C1}" dt="2025-04-15T20:57:59.946" v="22" actId="20577"/>
+            <ac:spMkLst>
+              <pc:docMk/>
+              <pc:sldMasterMk cId="773808826" sldId="2147483684"/>
+              <pc:sldLayoutMk cId="4277260665" sldId="2147483708"/>
+              <ac:spMk id="10" creationId="{98A04EB0-B065-6997-BC9B-0F930D874FC2}"/>
+            </ac:spMkLst>
+          </pc:spChg>
+          <pc:spChg chg="mod">
+            <ac:chgData name="Patrick Struzyna" userId="b998d42b-3731-425d-8f35-817176e8a205" providerId="ADAL" clId="{BD228509-EBEE-4041-AD03-C83B752495C1}" dt="2025-04-15T20:58:04.507" v="27" actId="20577"/>
+            <ac:spMkLst>
+              <pc:docMk/>
+              <pc:sldMasterMk cId="773808826" sldId="2147483684"/>
+              <pc:sldLayoutMk cId="4277260665" sldId="2147483708"/>
+              <ac:spMk id="22" creationId="{A70BE4FA-6AE1-77B9-B08B-E8E2E5A39E94}"/>
+            </ac:spMkLst>
+          </pc:spChg>
+          <pc:spChg chg="mod">
+            <ac:chgData name="Patrick Struzyna" userId="b998d42b-3731-425d-8f35-817176e8a205" providerId="ADAL" clId="{BD228509-EBEE-4041-AD03-C83B752495C1}" dt="2025-04-15T20:58:07.541" v="31" actId="20577"/>
+            <ac:spMkLst>
+              <pc:docMk/>
+              <pc:sldMasterMk cId="773808826" sldId="2147483684"/>
+              <pc:sldLayoutMk cId="4277260665" sldId="2147483708"/>
+              <ac:spMk id="28" creationId="{D9DB97A4-8CD5-34F5-4D2B-837FDB8A00EE}"/>
+            </ac:spMkLst>
+          </pc:spChg>
+          <pc:spChg chg="mod">
+            <ac:chgData name="Patrick Struzyna" userId="b998d42b-3731-425d-8f35-817176e8a205" providerId="ADAL" clId="{BD228509-EBEE-4041-AD03-C83B752495C1}" dt="2025-04-15T20:58:10.011" v="35" actId="20577"/>
+            <ac:spMkLst>
+              <pc:docMk/>
+              <pc:sldMasterMk cId="773808826" sldId="2147483684"/>
+              <pc:sldLayoutMk cId="4277260665" sldId="2147483708"/>
+              <ac:spMk id="29" creationId="{38E106AC-457C-7499-92D2-20E8D13D3FF0}"/>
+            </ac:spMkLst>
+          </pc:spChg>
+          <pc:spChg chg="mod">
+            <ac:chgData name="Patrick Struzyna" userId="b998d42b-3731-425d-8f35-817176e8a205" providerId="ADAL" clId="{BD228509-EBEE-4041-AD03-C83B752495C1}" dt="2025-04-15T20:58:14.050" v="42" actId="20577"/>
+            <ac:spMkLst>
+              <pc:docMk/>
+              <pc:sldMasterMk cId="773808826" sldId="2147483684"/>
+              <pc:sldLayoutMk cId="4277260665" sldId="2147483708"/>
+              <ac:spMk id="30" creationId="{D2DF3E84-8D49-7095-384F-F3FDD80C8AE1}"/>
+            </ac:spMkLst>
+          </pc:spChg>
+          <pc:spChg chg="mod">
+            <ac:chgData name="Patrick Struzyna" userId="b998d42b-3731-425d-8f35-817176e8a205" providerId="ADAL" clId="{BD228509-EBEE-4041-AD03-C83B752495C1}" dt="2025-04-15T20:58:18.769" v="48" actId="20577"/>
+            <ac:spMkLst>
+              <pc:docMk/>
+              <pc:sldMasterMk cId="773808826" sldId="2147483684"/>
+              <pc:sldLayoutMk cId="4277260665" sldId="2147483708"/>
+              <ac:spMk id="38" creationId="{68108BA6-69F9-EBF0-C12E-CA4D41B99AFC}"/>
+            </ac:spMkLst>
+          </pc:spChg>
+          <pc:spChg chg="mod">
+            <ac:chgData name="Patrick Struzyna" userId="b998d42b-3731-425d-8f35-817176e8a205" providerId="ADAL" clId="{BD228509-EBEE-4041-AD03-C83B752495C1}" dt="2025-04-15T20:58:23.443" v="61" actId="20577"/>
+            <ac:spMkLst>
+              <pc:docMk/>
+              <pc:sldMasterMk cId="773808826" sldId="2147483684"/>
+              <pc:sldLayoutMk cId="4277260665" sldId="2147483708"/>
+              <ac:spMk id="39" creationId="{07F91CE5-BC77-C3C9-0470-323252F10C11}"/>
+            </ac:spMkLst>
+          </pc:spChg>
+          <pc:spChg chg="mod">
+            <ac:chgData name="Patrick Struzyna" userId="b998d42b-3731-425d-8f35-817176e8a205" providerId="ADAL" clId="{BD228509-EBEE-4041-AD03-C83B752495C1}" dt="2025-04-15T20:58:41.078" v="104" actId="20577"/>
+            <ac:spMkLst>
+              <pc:docMk/>
+              <pc:sldMasterMk cId="773808826" sldId="2147483684"/>
+              <pc:sldLayoutMk cId="4277260665" sldId="2147483708"/>
+              <ac:spMk id="40" creationId="{B92C7814-7A63-BB88-AB5C-8CF82733BCCC}"/>
+            </ac:spMkLst>
+          </pc:spChg>
+          <pc:spChg chg="mod">
+            <ac:chgData name="Patrick Struzyna" userId="b998d42b-3731-425d-8f35-817176e8a205" providerId="ADAL" clId="{BD228509-EBEE-4041-AD03-C83B752495C1}" dt="2025-04-15T20:58:32.732" v="83" actId="20577"/>
+            <ac:spMkLst>
+              <pc:docMk/>
+              <pc:sldMasterMk cId="773808826" sldId="2147483684"/>
+              <pc:sldLayoutMk cId="4277260665" sldId="2147483708"/>
+              <ac:spMk id="41" creationId="{86C00AF8-8F18-F2AB-B226-D715C5EFC045}"/>
+            </ac:spMkLst>
+          </pc:spChg>
+          <pc:spChg chg="mod">
+            <ac:chgData name="Patrick Struzyna" userId="b998d42b-3731-425d-8f35-817176e8a205" providerId="ADAL" clId="{BD228509-EBEE-4041-AD03-C83B752495C1}" dt="2025-04-15T20:58:37.888" v="95" actId="20577"/>
+            <ac:spMkLst>
+              <pc:docMk/>
+              <pc:sldMasterMk cId="773808826" sldId="2147483684"/>
+              <pc:sldLayoutMk cId="4277260665" sldId="2147483708"/>
+              <ac:spMk id="42" creationId="{46974B3E-D267-C8B1-E8F3-84029FDDEE5D}"/>
+            </ac:spMkLst>
+          </pc:spChg>
+          <pc:spChg chg="mod">
+            <ac:chgData name="Patrick Struzyna" userId="b998d42b-3731-425d-8f35-817176e8a205" providerId="ADAL" clId="{BD228509-EBEE-4041-AD03-C83B752495C1}" dt="2025-04-15T20:58:27.952" v="74" actId="20577"/>
+            <ac:spMkLst>
+              <pc:docMk/>
+              <pc:sldMasterMk cId="773808826" sldId="2147483684"/>
+              <pc:sldLayoutMk cId="4277260665" sldId="2147483708"/>
+              <ac:spMk id="43" creationId="{4B63F66F-616B-73CC-BB35-6E7BAF81B96E}"/>
+            </ac:spMkLst>
+          </pc:spChg>
+          <pc:spChg chg="mod">
+            <ac:chgData name="Patrick Struzyna" userId="b998d42b-3731-425d-8f35-817176e8a205" providerId="ADAL" clId="{BD228509-EBEE-4041-AD03-C83B752495C1}" dt="2025-04-15T20:58:44.516" v="110" actId="20577"/>
+            <ac:spMkLst>
+              <pc:docMk/>
+              <pc:sldMasterMk cId="773808826" sldId="2147483684"/>
+              <pc:sldLayoutMk cId="4277260665" sldId="2147483708"/>
+              <ac:spMk id="44" creationId="{8F3E3E92-33C1-23DD-F70C-56DC578DBAC2}"/>
+            </ac:spMkLst>
+          </pc:spChg>
+          <pc:spChg chg="mod">
+            <ac:chgData name="Patrick Struzyna" userId="b998d42b-3731-425d-8f35-817176e8a205" providerId="ADAL" clId="{BD228509-EBEE-4041-AD03-C83B752495C1}" dt="2025-04-15T20:58:48.697" v="120" actId="20577"/>
+            <ac:spMkLst>
+              <pc:docMk/>
+              <pc:sldMasterMk cId="773808826" sldId="2147483684"/>
+              <pc:sldLayoutMk cId="4277260665" sldId="2147483708"/>
+              <ac:spMk id="45" creationId="{04F87548-624E-3E53-29B2-677554FFAB27}"/>
+            </ac:spMkLst>
+          </pc:spChg>
+        </pc:sldLayoutChg>
+      </pc:sldMasterChg>
+    </pc:docChg>
+  </pc:docChgLst>
+</pc:chgInfo>
 </file>
 
 <file path=ppt/notesMasters/notesMaster1.xml><?xml version="1.0" encoding="utf-8"?>
@@ -6346,9 +6611,10 @@
           <a:p>
             <a:pPr lvl="0"/>
             <a:r>
-              <a:rPr lang="de-DE" dirty="0"/>
-              <a:t>Name</a:t>
-            </a:r>
+              <a:rPr lang="de-DE" dirty="0" err="1"/>
+              <a:t>name</a:t>
+            </a:r>
+            <a:endParaRPr lang="de-DE" dirty="0"/>
           </a:p>
         </p:txBody>
       </p:sp>
@@ -6599,9 +6865,10 @@
           <a:p>
             <a:pPr lvl="0"/>
             <a:r>
-              <a:rPr lang="de-DE" dirty="0"/>
-              <a:t>Datum</a:t>
-            </a:r>
+              <a:rPr lang="de-DE" dirty="0" err="1"/>
+              <a:t>datum</a:t>
+            </a:r>
+            <a:endParaRPr lang="de-DE" dirty="0"/>
           </a:p>
         </p:txBody>
       </p:sp>
@@ -6643,9 +6910,10 @@
           <a:p>
             <a:pPr lvl="0"/>
             <a:r>
-              <a:rPr lang="de-DE" dirty="0"/>
-              <a:t>LK</a:t>
-            </a:r>
+              <a:rPr lang="de-DE" dirty="0" err="1"/>
+              <a:t>lk</a:t>
+            </a:r>
+            <a:endParaRPr lang="de-DE" dirty="0"/>
           </a:p>
         </p:txBody>
       </p:sp>
@@ -6687,9 +6955,10 @@
           <a:p>
             <a:pPr lvl="0"/>
             <a:r>
-              <a:rPr lang="de-DE" dirty="0"/>
-              <a:t>Fach</a:t>
-            </a:r>
+              <a:rPr lang="de-DE" dirty="0" err="1"/>
+              <a:t>fach</a:t>
+            </a:r>
+            <a:endParaRPr lang="de-DE" dirty="0"/>
           </a:p>
         </p:txBody>
       </p:sp>
@@ -6731,9 +7000,10 @@
           <a:p>
             <a:pPr lvl="0"/>
             <a:r>
-              <a:rPr lang="de-DE" dirty="0"/>
-              <a:t>Nachbar Name</a:t>
-            </a:r>
+              <a:rPr lang="de-DE" dirty="0" err="1"/>
+              <a:t>nachbar</a:t>
+            </a:r>
+            <a:endParaRPr lang="de-DE" dirty="0"/>
           </a:p>
         </p:txBody>
       </p:sp>
@@ -6944,9 +7214,10 @@
           <a:p>
             <a:pPr lvl="0"/>
             <a:r>
-              <a:rPr lang="de-DE" dirty="0"/>
-              <a:t>Motto</a:t>
-            </a:r>
+              <a:rPr lang="de-DE" dirty="0" err="1"/>
+              <a:t>motto</a:t>
+            </a:r>
+            <a:endParaRPr lang="de-DE" dirty="0"/>
           </a:p>
         </p:txBody>
       </p:sp>
@@ -6988,9 +7259,10 @@
           <a:p>
             <a:pPr lvl="0"/>
             <a:r>
-              <a:rPr lang="de-DE" dirty="0"/>
-              <a:t>Hobbys</a:t>
-            </a:r>
+              <a:rPr lang="de-DE" dirty="0" err="1"/>
+              <a:t>hobbies</a:t>
+            </a:r>
+            <a:endParaRPr lang="de-DE" dirty="0"/>
           </a:p>
         </p:txBody>
       </p:sp>
@@ -7032,9 +7304,10 @@
           <a:p>
             <a:pPr lvl="0"/>
             <a:r>
-              <a:rPr lang="de-DE" dirty="0"/>
-              <a:t>Nachricht</a:t>
-            </a:r>
+              <a:rPr lang="de-DE" dirty="0" err="1"/>
+              <a:t>nachricht</a:t>
+            </a:r>
+            <a:endParaRPr lang="de-DE" dirty="0"/>
           </a:p>
         </p:txBody>
       </p:sp>
@@ -7076,17 +7349,10 @@
           <a:p>
             <a:pPr lvl="0"/>
             <a:r>
-              <a:rPr lang="de-DE" dirty="0"/>
-              <a:t>Nam </a:t>
-            </a:r>
-            <a:r>
               <a:rPr lang="de-DE" dirty="0" err="1"/>
-              <a:t>Nam</a:t>
-            </a:r>
-            <a:r>
-              <a:rPr lang="de-DE" dirty="0"/>
-              <a:t> </a:t>
-            </a:r>
+              <a:t>snack</a:t>
+            </a:r>
+            <a:endParaRPr lang="de-DE" dirty="0"/>
           </a:p>
         </p:txBody>
       </p:sp>
@@ -7128,9 +7394,10 @@
           <a:p>
             <a:pPr lvl="0"/>
             <a:r>
-              <a:rPr lang="de-DE" dirty="0"/>
-              <a:t>Memorys</a:t>
-            </a:r>
+              <a:rPr lang="de-DE" dirty="0" err="1"/>
+              <a:t>erinnerung</a:t>
+            </a:r>
+            <a:endParaRPr lang="de-DE" dirty="0"/>
           </a:p>
         </p:txBody>
       </p:sp>
@@ -7173,7 +7440,7 @@
             <a:pPr lvl="0"/>
             <a:r>
               <a:rPr lang="de-DE" dirty="0"/>
-              <a:t>Beigebracht</a:t>
+              <a:t>beigebracht</a:t>
             </a:r>
           </a:p>
         </p:txBody>
@@ -7216,9 +7483,10 @@
           <a:p>
             <a:pPr lvl="0"/>
             <a:r>
-              <a:rPr lang="de-DE" dirty="0"/>
-              <a:t>Job</a:t>
-            </a:r>
+              <a:rPr lang="de-DE" dirty="0" err="1"/>
+              <a:t>job</a:t>
+            </a:r>
+            <a:endParaRPr lang="de-DE" dirty="0"/>
           </a:p>
         </p:txBody>
       </p:sp>
@@ -7260,9 +7528,10 @@
           <a:p>
             <a:pPr lvl="0"/>
             <a:r>
-              <a:rPr lang="de-DE" dirty="0"/>
-              <a:t>10 Jahre</a:t>
-            </a:r>
+              <a:rPr lang="de-DE" dirty="0" err="1"/>
+              <a:t>zukunft</a:t>
+            </a:r>
+            <a:endParaRPr lang="de-DE" dirty="0"/>
           </a:p>
         </p:txBody>
       </p:sp>
@@ -9872,7 +10141,7 @@
       </p:grpSpPr>
       <p:sp>
         <p:nvSpPr>
-          <p:cNvPr id="2" name="Textplatzhalter 1">
+          <p:cNvPr id="2" name="name">
             <a:extLst>
               <a:ext uri="{FF2B5EF4-FFF2-40B4-BE49-F238E27FC236}">
                 <a16:creationId xmlns:a16="http://schemas.microsoft.com/office/drawing/2014/main" id="{7F8ACC8F-BA12-AE8E-CB96-5D1E357EC026}"/>
@@ -9958,7 +10227,7 @@
       </p:sp>
       <p:sp>
         <p:nvSpPr>
-          <p:cNvPr id="5" name="Textplatzhalter 4">
+          <p:cNvPr id="5" name="datum">
             <a:extLst>
               <a:ext uri="{FF2B5EF4-FFF2-40B4-BE49-F238E27FC236}">
                 <a16:creationId xmlns:a16="http://schemas.microsoft.com/office/drawing/2014/main" id="{E7B291FF-AB97-1450-BAB2-CF09F093B70F}"/>
@@ -9994,7 +10263,7 @@
       </p:sp>
       <p:sp>
         <p:nvSpPr>
-          <p:cNvPr id="6" name="Textplatzhalter 5">
+          <p:cNvPr id="6" name="lk">
             <a:extLst>
               <a:ext uri="{FF2B5EF4-FFF2-40B4-BE49-F238E27FC236}">
                 <a16:creationId xmlns:a16="http://schemas.microsoft.com/office/drawing/2014/main" id="{33A922BC-A1AA-AE93-E84D-BCB9061E82D9}"/>
@@ -10026,14 +10295,11 @@
               <a:t>}</a:t>
             </a:r>
           </a:p>
-          <a:p>
-            <a:endParaRPr lang="de-DE" dirty="0"/>
-          </a:p>
-        </p:txBody>
-      </p:sp>
-      <p:sp>
-        <p:nvSpPr>
-          <p:cNvPr id="7" name="Textplatzhalter 6">
+        </p:txBody>
+      </p:sp>
+      <p:sp>
+        <p:nvSpPr>
+          <p:cNvPr id="7" name="fach">
             <a:extLst>
               <a:ext uri="{FF2B5EF4-FFF2-40B4-BE49-F238E27FC236}">
                 <a16:creationId xmlns:a16="http://schemas.microsoft.com/office/drawing/2014/main" id="{126C4CFE-D9B1-18BB-823F-28F648068F7C}"/>
@@ -10069,7 +10335,7 @@
       </p:sp>
       <p:sp>
         <p:nvSpPr>
-          <p:cNvPr id="8" name="Textplatzhalter 7">
+          <p:cNvPr id="8" name="nachbar">
             <a:extLst>
               <a:ext uri="{FF2B5EF4-FFF2-40B4-BE49-F238E27FC236}">
                 <a16:creationId xmlns:a16="http://schemas.microsoft.com/office/drawing/2014/main" id="{20F84033-1852-7433-DAB3-7154C16F0363}"/>
@@ -10105,7 +10371,7 @@
       </p:sp>
       <p:sp>
         <p:nvSpPr>
-          <p:cNvPr id="9" name="Textplatzhalter 8">
+          <p:cNvPr id="9" name="motto">
             <a:extLst>
               <a:ext uri="{FF2B5EF4-FFF2-40B4-BE49-F238E27FC236}">
                 <a16:creationId xmlns:a16="http://schemas.microsoft.com/office/drawing/2014/main" id="{64905E3B-83EA-D084-EB24-689F8329F107}"/>
@@ -10141,7 +10407,7 @@
       </p:sp>
       <p:sp>
         <p:nvSpPr>
-          <p:cNvPr id="10" name="Textplatzhalter 9">
+          <p:cNvPr id="10" name="hobbies">
             <a:extLst>
               <a:ext uri="{FF2B5EF4-FFF2-40B4-BE49-F238E27FC236}">
                 <a16:creationId xmlns:a16="http://schemas.microsoft.com/office/drawing/2014/main" id="{A0916798-0E44-EFFF-B2E3-D4FD36C0582B}"/>
@@ -10177,7 +10443,7 @@
       </p:sp>
       <p:sp>
         <p:nvSpPr>
-          <p:cNvPr id="11" name="Textplatzhalter 10">
+          <p:cNvPr id="11" name="nachricht">
             <a:extLst>
               <a:ext uri="{FF2B5EF4-FFF2-40B4-BE49-F238E27FC236}">
                 <a16:creationId xmlns:a16="http://schemas.microsoft.com/office/drawing/2014/main" id="{BC82B7C4-9603-5AD4-4EF1-D6F34B9E1E58}"/>
@@ -10213,7 +10479,7 @@
       </p:sp>
       <p:sp>
         <p:nvSpPr>
-          <p:cNvPr id="12" name="Textplatzhalter 11">
+          <p:cNvPr id="12" name="snack">
             <a:extLst>
               <a:ext uri="{FF2B5EF4-FFF2-40B4-BE49-F238E27FC236}">
                 <a16:creationId xmlns:a16="http://schemas.microsoft.com/office/drawing/2014/main" id="{0710BEB7-7565-B883-6E4D-B8E53AB7D6CF}"/>
@@ -10249,7 +10515,7 @@
       </p:sp>
       <p:sp>
         <p:nvSpPr>
-          <p:cNvPr id="13" name="Textplatzhalter 12">
+          <p:cNvPr id="13" name="erinnerung">
             <a:extLst>
               <a:ext uri="{FF2B5EF4-FFF2-40B4-BE49-F238E27FC236}">
                 <a16:creationId xmlns:a16="http://schemas.microsoft.com/office/drawing/2014/main" id="{46573461-561F-1C1C-3C4C-A0786DE7CA0E}"/>
@@ -10285,7 +10551,7 @@
       </p:sp>
       <p:sp>
         <p:nvSpPr>
-          <p:cNvPr id="14" name="Textplatzhalter 13">
+          <p:cNvPr id="14" name="beigebracht">
             <a:extLst>
               <a:ext uri="{FF2B5EF4-FFF2-40B4-BE49-F238E27FC236}">
                 <a16:creationId xmlns:a16="http://schemas.microsoft.com/office/drawing/2014/main" id="{38F65BA3-D994-504F-793B-AC889BE4FF88}"/>
@@ -10313,7 +10579,7 @@
       </p:sp>
       <p:sp>
         <p:nvSpPr>
-          <p:cNvPr id="15" name="Textplatzhalter 14">
+          <p:cNvPr id="15" name="job">
             <a:extLst>
               <a:ext uri="{FF2B5EF4-FFF2-40B4-BE49-F238E27FC236}">
                 <a16:creationId xmlns:a16="http://schemas.microsoft.com/office/drawing/2014/main" id="{974D2E7E-FDC4-B68D-8D9F-62019DB3CF4C}"/>
@@ -10349,7 +10615,7 @@
       </p:sp>
       <p:sp>
         <p:nvSpPr>
-          <p:cNvPr id="16" name="Textplatzhalter 15">
+          <p:cNvPr id="16" name="zukunft">
             <a:extLst>
               <a:ext uri="{FF2B5EF4-FFF2-40B4-BE49-F238E27FC236}">
                 <a16:creationId xmlns:a16="http://schemas.microsoft.com/office/drawing/2014/main" id="{7E482C1A-9262-189E-D70B-555649E239B9}"/>

</xml_diff>